<commit_message>
docs. Update RELEASENOTE.md, README.md, Add ppt
</commit_message>
<xml_diff>
--- a/pptx/Readme-240503.pptx
+++ b/pptx/Readme-240503.pptx
@@ -8,6 +8,7 @@
     <p:sldId id="261" r:id="rId2"/>
     <p:sldId id="260" r:id="rId3"/>
     <p:sldId id="259" r:id="rId4"/>
+    <p:sldId id="256" r:id="rId5"/>
   </p:sldIdLst>
   <p:sldSz cx="12192000" cy="6858000"/>
   <p:notesSz cx="6858000" cy="9144000"/>
@@ -107,6 +108,22 @@
     </a:lvl9pPr>
   </p:defaultTextStyle>
   <p:extLst>
+    <p:ext uri="{521415D9-36F7-43E2-AB2F-B90AF26B5E84}">
+      <p14:sectionLst xmlns:p14="http://schemas.microsoft.com/office/powerpoint/2010/main">
+        <p14:section name="기본 구역" id="{858B1A6C-D735-4D61-8878-40B98057670E}">
+          <p14:sldIdLst>
+            <p14:sldId id="261"/>
+            <p14:sldId id="260"/>
+            <p14:sldId id="259"/>
+          </p14:sldIdLst>
+        </p14:section>
+        <p14:section name="제목 없는 구역" id="{353A4750-4814-436F-9741-D89066E9719B}">
+          <p14:sldIdLst>
+            <p14:sldId id="256"/>
+          </p14:sldIdLst>
+        </p14:section>
+      </p14:sectionLst>
+    </p:ext>
     <p:ext uri="{EFAFB233-063F-42B5-8137-9DF3F51BA10A}">
       <p15:sldGuideLst xmlns:p15="http://schemas.microsoft.com/office/powerpoint/2012/main">
         <p15:guide id="1" orient="horz" pos="2160" userDrawn="1">
@@ -272,7 +289,7 @@
           <a:p>
             <a:fld id="{5C3B08C0-BC4F-44B2-8BD1-E68E9114CF9B}" type="datetimeFigureOut">
               <a:rPr lang="ko-KR" altLang="en-US" smtClean="0"/>
-              <a:t>2024-05-03</a:t>
+              <a:t>2024-05-13</a:t>
             </a:fld>
             <a:endParaRPr lang="ko-KR" altLang="en-US" dirty="0"/>
           </a:p>
@@ -470,7 +487,7 @@
           <a:p>
             <a:fld id="{5C3B08C0-BC4F-44B2-8BD1-E68E9114CF9B}" type="datetimeFigureOut">
               <a:rPr lang="ko-KR" altLang="en-US" smtClean="0"/>
-              <a:t>2024-05-03</a:t>
+              <a:t>2024-05-13</a:t>
             </a:fld>
             <a:endParaRPr lang="ko-KR" altLang="en-US" dirty="0"/>
           </a:p>
@@ -678,7 +695,7 @@
           <a:p>
             <a:fld id="{5C3B08C0-BC4F-44B2-8BD1-E68E9114CF9B}" type="datetimeFigureOut">
               <a:rPr lang="ko-KR" altLang="en-US" smtClean="0"/>
-              <a:t>2024-05-03</a:t>
+              <a:t>2024-05-13</a:t>
             </a:fld>
             <a:endParaRPr lang="ko-KR" altLang="en-US" dirty="0"/>
           </a:p>
@@ -876,7 +893,7 @@
           <a:p>
             <a:fld id="{5C3B08C0-BC4F-44B2-8BD1-E68E9114CF9B}" type="datetimeFigureOut">
               <a:rPr lang="ko-KR" altLang="en-US" smtClean="0"/>
-              <a:t>2024-05-03</a:t>
+              <a:t>2024-05-13</a:t>
             </a:fld>
             <a:endParaRPr lang="ko-KR" altLang="en-US" dirty="0"/>
           </a:p>
@@ -1151,7 +1168,7 @@
           <a:p>
             <a:fld id="{5C3B08C0-BC4F-44B2-8BD1-E68E9114CF9B}" type="datetimeFigureOut">
               <a:rPr lang="ko-KR" altLang="en-US" smtClean="0"/>
-              <a:t>2024-05-03</a:t>
+              <a:t>2024-05-13</a:t>
             </a:fld>
             <a:endParaRPr lang="ko-KR" altLang="en-US" dirty="0"/>
           </a:p>
@@ -1416,7 +1433,7 @@
           <a:p>
             <a:fld id="{5C3B08C0-BC4F-44B2-8BD1-E68E9114CF9B}" type="datetimeFigureOut">
               <a:rPr lang="ko-KR" altLang="en-US" smtClean="0"/>
-              <a:t>2024-05-03</a:t>
+              <a:t>2024-05-13</a:t>
             </a:fld>
             <a:endParaRPr lang="ko-KR" altLang="en-US" dirty="0"/>
           </a:p>
@@ -1828,7 +1845,7 @@
           <a:p>
             <a:fld id="{5C3B08C0-BC4F-44B2-8BD1-E68E9114CF9B}" type="datetimeFigureOut">
               <a:rPr lang="ko-KR" altLang="en-US" smtClean="0"/>
-              <a:t>2024-05-03</a:t>
+              <a:t>2024-05-13</a:t>
             </a:fld>
             <a:endParaRPr lang="ko-KR" altLang="en-US" dirty="0"/>
           </a:p>
@@ -1969,7 +1986,7 @@
           <a:p>
             <a:fld id="{5C3B08C0-BC4F-44B2-8BD1-E68E9114CF9B}" type="datetimeFigureOut">
               <a:rPr lang="ko-KR" altLang="en-US" smtClean="0"/>
-              <a:t>2024-05-03</a:t>
+              <a:t>2024-05-13</a:t>
             </a:fld>
             <a:endParaRPr lang="ko-KR" altLang="en-US" dirty="0"/>
           </a:p>
@@ -2082,7 +2099,7 @@
           <a:p>
             <a:fld id="{5C3B08C0-BC4F-44B2-8BD1-E68E9114CF9B}" type="datetimeFigureOut">
               <a:rPr lang="ko-KR" altLang="en-US" smtClean="0"/>
-              <a:t>2024-05-03</a:t>
+              <a:t>2024-05-13</a:t>
             </a:fld>
             <a:endParaRPr lang="ko-KR" altLang="en-US" dirty="0"/>
           </a:p>
@@ -2393,7 +2410,7 @@
           <a:p>
             <a:fld id="{5C3B08C0-BC4F-44B2-8BD1-E68E9114CF9B}" type="datetimeFigureOut">
               <a:rPr lang="ko-KR" altLang="en-US" smtClean="0"/>
-              <a:t>2024-05-03</a:t>
+              <a:t>2024-05-13</a:t>
             </a:fld>
             <a:endParaRPr lang="ko-KR" altLang="en-US" dirty="0"/>
           </a:p>
@@ -2681,7 +2698,7 @@
           <a:p>
             <a:fld id="{5C3B08C0-BC4F-44B2-8BD1-E68E9114CF9B}" type="datetimeFigureOut">
               <a:rPr lang="ko-KR" altLang="en-US" smtClean="0"/>
-              <a:t>2024-05-03</a:t>
+              <a:t>2024-05-13</a:t>
             </a:fld>
             <a:endParaRPr lang="ko-KR" altLang="en-US" dirty="0"/>
           </a:p>
@@ -2922,7 +2939,7 @@
           <a:p>
             <a:fld id="{5C3B08C0-BC4F-44B2-8BD1-E68E9114CF9B}" type="datetimeFigureOut">
               <a:rPr lang="ko-KR" altLang="en-US" smtClean="0"/>
-              <a:t>2024-05-03</a:t>
+              <a:t>2024-05-13</a:t>
             </a:fld>
             <a:endParaRPr lang="ko-KR" altLang="en-US" dirty="0"/>
           </a:p>
@@ -7501,6 +7518,1857 @@
 </p:sld>
 </file>
 
+<file path=ppt/slides/slide4.xml><?xml version="1.0" encoding="utf-8"?>
+<p:sld xmlns:a="http://schemas.openxmlformats.org/drawingml/2006/main" xmlns:r="http://schemas.openxmlformats.org/officeDocument/2006/relationships" xmlns:p="http://schemas.openxmlformats.org/presentationml/2006/main">
+  <p:cSld>
+    <p:spTree>
+      <p:nvGrpSpPr>
+        <p:cNvPr id="1" name=""/>
+        <p:cNvGrpSpPr/>
+        <p:nvPr/>
+      </p:nvGrpSpPr>
+      <p:grpSpPr>
+        <a:xfrm>
+          <a:off x="0" y="0"/>
+          <a:ext cx="0" cy="0"/>
+          <a:chOff x="0" y="0"/>
+          <a:chExt cx="0" cy="0"/>
+        </a:xfrm>
+      </p:grpSpPr>
+      <p:grpSp>
+        <p:nvGrpSpPr>
+          <p:cNvPr id="10" name="그룹 9">
+            <a:extLst>
+              <a:ext uri="{FF2B5EF4-FFF2-40B4-BE49-F238E27FC236}">
+                <a16:creationId xmlns:a16="http://schemas.microsoft.com/office/drawing/2014/main" id="{7AC50248-0A08-6F63-AEFA-41AA1CA15ED7}"/>
+              </a:ext>
+            </a:extLst>
+          </p:cNvPr>
+          <p:cNvGrpSpPr/>
+          <p:nvPr/>
+        </p:nvGrpSpPr>
+        <p:grpSpPr>
+          <a:xfrm>
+            <a:off x="0" y="1"/>
+            <a:ext cx="12192000" cy="6858000"/>
+            <a:chOff x="0" y="1"/>
+            <a:chExt cx="12192000" cy="6858000"/>
+          </a:xfrm>
+        </p:grpSpPr>
+        <p:grpSp>
+          <p:nvGrpSpPr>
+            <p:cNvPr id="5" name="그룹 4">
+              <a:extLst>
+                <a:ext uri="{FF2B5EF4-FFF2-40B4-BE49-F238E27FC236}">
+                  <a16:creationId xmlns:a16="http://schemas.microsoft.com/office/drawing/2014/main" id="{C43ABEF9-0749-FD96-C56D-E641A653A72D}"/>
+                </a:ext>
+              </a:extLst>
+            </p:cNvPr>
+            <p:cNvGrpSpPr/>
+            <p:nvPr/>
+          </p:nvGrpSpPr>
+          <p:grpSpPr>
+            <a:xfrm>
+              <a:off x="0" y="1"/>
+              <a:ext cx="12192000" cy="6858000"/>
+              <a:chOff x="0" y="1"/>
+              <a:chExt cx="12192000" cy="6858000"/>
+            </a:xfrm>
+          </p:grpSpPr>
+          <p:grpSp>
+            <p:nvGrpSpPr>
+              <p:cNvPr id="4" name="그룹 3">
+                <a:extLst>
+                  <a:ext uri="{FF2B5EF4-FFF2-40B4-BE49-F238E27FC236}">
+                    <a16:creationId xmlns:a16="http://schemas.microsoft.com/office/drawing/2014/main" id="{025FFD3A-3E1F-301B-E768-E09605D6178A}"/>
+                  </a:ext>
+                </a:extLst>
+              </p:cNvPr>
+              <p:cNvGrpSpPr/>
+              <p:nvPr/>
+            </p:nvGrpSpPr>
+            <p:grpSpPr>
+              <a:xfrm>
+                <a:off x="0" y="1"/>
+                <a:ext cx="12192000" cy="6858000"/>
+                <a:chOff x="0" y="1"/>
+                <a:chExt cx="12192000" cy="6858000"/>
+              </a:xfrm>
+            </p:grpSpPr>
+            <p:sp>
+              <p:nvSpPr>
+                <p:cNvPr id="2" name="직사각형 1">
+                  <a:extLst>
+                    <a:ext uri="{FF2B5EF4-FFF2-40B4-BE49-F238E27FC236}">
+                      <a16:creationId xmlns:a16="http://schemas.microsoft.com/office/drawing/2014/main" id="{075108B7-8FC6-7250-8160-E5CCF03E3863}"/>
+                    </a:ext>
+                  </a:extLst>
+                </p:cNvPr>
+                <p:cNvSpPr/>
+                <p:nvPr/>
+              </p:nvSpPr>
+              <p:spPr>
+                <a:xfrm>
+                  <a:off x="0" y="1"/>
+                  <a:ext cx="12192000" cy="6858000"/>
+                </a:xfrm>
+                <a:prstGeom prst="rect">
+                  <a:avLst/>
+                </a:prstGeom>
+                <a:solidFill>
+                  <a:schemeClr val="bg2"/>
+                </a:solidFill>
+              </p:spPr>
+              <p:style>
+                <a:lnRef idx="2">
+                  <a:schemeClr val="accent1">
+                    <a:shade val="50000"/>
+                  </a:schemeClr>
+                </a:lnRef>
+                <a:fillRef idx="1">
+                  <a:schemeClr val="accent1"/>
+                </a:fillRef>
+                <a:effectRef idx="0">
+                  <a:schemeClr val="accent1"/>
+                </a:effectRef>
+                <a:fontRef idx="minor">
+                  <a:schemeClr val="lt1"/>
+                </a:fontRef>
+              </p:style>
+              <p:txBody>
+                <a:bodyPr rtlCol="0" anchor="ctr"/>
+                <a:lstStyle/>
+                <a:p>
+                  <a:pPr algn="ctr"/>
+                  <a:endParaRPr lang="ko-KR" altLang="en-US"/>
+                </a:p>
+              </p:txBody>
+            </p:sp>
+            <p:grpSp>
+              <p:nvGrpSpPr>
+                <p:cNvPr id="55" name="그룹 54">
+                  <a:extLst>
+                    <a:ext uri="{FF2B5EF4-FFF2-40B4-BE49-F238E27FC236}">
+                      <a16:creationId xmlns:a16="http://schemas.microsoft.com/office/drawing/2014/main" id="{7015F087-D44A-4A9E-0B96-30BB4CBC280D}"/>
+                    </a:ext>
+                  </a:extLst>
+                </p:cNvPr>
+                <p:cNvGrpSpPr/>
+                <p:nvPr/>
+              </p:nvGrpSpPr>
+              <p:grpSpPr>
+                <a:xfrm>
+                  <a:off x="735290" y="665172"/>
+                  <a:ext cx="11001507" cy="5688494"/>
+                  <a:chOff x="691739" y="536861"/>
+                  <a:chExt cx="11255414" cy="5907572"/>
+                </a:xfrm>
+              </p:grpSpPr>
+              <p:pic>
+                <p:nvPicPr>
+                  <p:cNvPr id="1028" name="Picture 4" descr="User PNGs for Free Download">
+                    <a:extLst>
+                      <a:ext uri="{FF2B5EF4-FFF2-40B4-BE49-F238E27FC236}">
+                        <a16:creationId xmlns:a16="http://schemas.microsoft.com/office/drawing/2014/main" id="{824B25FC-AB3C-B13C-8480-231C937F0178}"/>
+                      </a:ext>
+                    </a:extLst>
+                  </p:cNvPr>
+                  <p:cNvPicPr>
+                    <a:picLocks noChangeAspect="1" noChangeArrowheads="1"/>
+                  </p:cNvPicPr>
+                  <p:nvPr/>
+                </p:nvPicPr>
+                <p:blipFill>
+                  <a:blip r:embed="rId2">
+                    <a:extLst>
+                      <a:ext uri="{28A0092B-C50C-407E-A947-70E740481C1C}">
+                        <a14:useLocalDpi xmlns:a14="http://schemas.microsoft.com/office/drawing/2010/main" val="0"/>
+                      </a:ext>
+                    </a:extLst>
+                  </a:blip>
+                  <a:srcRect/>
+                  <a:stretch>
+                    <a:fillRect/>
+                  </a:stretch>
+                </p:blipFill>
+                <p:spPr bwMode="auto">
+                  <a:xfrm>
+                    <a:off x="952381" y="536861"/>
+                    <a:ext cx="1229879" cy="745381"/>
+                  </a:xfrm>
+                  <a:prstGeom prst="rect">
+                    <a:avLst/>
+                  </a:prstGeom>
+                  <a:noFill/>
+                  <a:extLst>
+                    <a:ext uri="{909E8E84-426E-40DD-AFC4-6F175D3DCCD1}">
+                      <a14:hiddenFill xmlns:a14="http://schemas.microsoft.com/office/drawing/2010/main">
+                        <a:solidFill>
+                          <a:srgbClr val="FFFFFF"/>
+                        </a:solidFill>
+                      </a14:hiddenFill>
+                    </a:ext>
+                  </a:extLst>
+                </p:spPr>
+              </p:pic>
+              <p:sp>
+                <p:nvSpPr>
+                  <p:cNvPr id="6" name="TextBox 5">
+                    <a:extLst>
+                      <a:ext uri="{FF2B5EF4-FFF2-40B4-BE49-F238E27FC236}">
+                        <a16:creationId xmlns:a16="http://schemas.microsoft.com/office/drawing/2014/main" id="{4074CF2B-81E0-B294-35BD-8F17B2A01A49}"/>
+                      </a:ext>
+                    </a:extLst>
+                  </p:cNvPr>
+                  <p:cNvSpPr txBox="1"/>
+                  <p:nvPr/>
+                </p:nvSpPr>
+                <p:spPr>
+                  <a:xfrm>
+                    <a:off x="691739" y="1287915"/>
+                    <a:ext cx="1805879" cy="646331"/>
+                  </a:xfrm>
+                  <a:prstGeom prst="rect">
+                    <a:avLst/>
+                  </a:prstGeom>
+                  <a:noFill/>
+                </p:spPr>
+                <p:txBody>
+                  <a:bodyPr wrap="none" rtlCol="0">
+                    <a:spAutoFit/>
+                  </a:bodyPr>
+                  <a:lstStyle/>
+                  <a:p>
+                    <a:pPr algn="ctr"/>
+                    <a:r>
+                      <a:rPr lang="en-US" altLang="ko-KR" sz="1800" b="1" dirty="0">
+                        <a:solidFill>
+                          <a:schemeClr val="tx1"/>
+                        </a:solidFill>
+                      </a:rPr>
+                      <a:t>User</a:t>
+                    </a:r>
+                  </a:p>
+                  <a:p>
+                    <a:pPr algn="ctr"/>
+                    <a:r>
+                      <a:rPr lang="en-US" altLang="ko-KR" sz="1800" b="1" dirty="0">
+                        <a:solidFill>
+                          <a:schemeClr val="tx1"/>
+                        </a:solidFill>
+                      </a:rPr>
+                      <a:t>(</a:t>
+                    </a:r>
+                    <a:r>
+                      <a:rPr lang="en-US" altLang="ko-KR" sz="1800" b="1" dirty="0" err="1">
+                        <a:solidFill>
+                          <a:schemeClr val="tx1"/>
+                        </a:solidFill>
+                      </a:rPr>
+                      <a:t>Resoure</a:t>
+                    </a:r>
+                    <a:r>
+                      <a:rPr lang="en-US" altLang="ko-KR" sz="1800" b="1" dirty="0">
+                        <a:solidFill>
+                          <a:schemeClr val="tx1"/>
+                        </a:solidFill>
+                      </a:rPr>
+                      <a:t> User)</a:t>
+                    </a:r>
+                    <a:endParaRPr lang="ko-KR" altLang="en-US" sz="1800" b="1" dirty="0">
+                      <a:solidFill>
+                        <a:schemeClr val="tx1"/>
+                      </a:solidFill>
+                    </a:endParaRPr>
+                  </a:p>
+                </p:txBody>
+              </p:sp>
+              <p:grpSp>
+                <p:nvGrpSpPr>
+                  <p:cNvPr id="8" name="그룹 7">
+                    <a:extLst>
+                      <a:ext uri="{FF2B5EF4-FFF2-40B4-BE49-F238E27FC236}">
+                        <a16:creationId xmlns:a16="http://schemas.microsoft.com/office/drawing/2014/main" id="{C267D92F-789A-74E7-A04C-0A83F3DC18C6}"/>
+                      </a:ext>
+                    </a:extLst>
+                  </p:cNvPr>
+                  <p:cNvGrpSpPr/>
+                  <p:nvPr/>
+                </p:nvGrpSpPr>
+                <p:grpSpPr>
+                  <a:xfrm>
+                    <a:off x="6866548" y="542972"/>
+                    <a:ext cx="794468" cy="782062"/>
+                    <a:chOff x="-7202673" y="635036"/>
+                    <a:chExt cx="3870572" cy="3787945"/>
+                  </a:xfrm>
+                </p:grpSpPr>
+                <p:pic>
+                  <p:nvPicPr>
+                    <p:cNvPr id="1038" name="Picture 14" descr="구글 - 무료 소셜 미디어개 아이콘">
+                      <a:extLst>
+                        <a:ext uri="{FF2B5EF4-FFF2-40B4-BE49-F238E27FC236}">
+                          <a16:creationId xmlns:a16="http://schemas.microsoft.com/office/drawing/2014/main" id="{01F66115-E1DB-E66F-14DC-2D153F27C442}"/>
+                        </a:ext>
+                      </a:extLst>
+                    </p:cNvPr>
+                    <p:cNvPicPr>
+                      <a:picLocks noChangeAspect="1" noChangeArrowheads="1"/>
+                    </p:cNvPicPr>
+                    <p:nvPr/>
+                  </p:nvPicPr>
+                  <p:blipFill>
+                    <a:blip r:embed="rId3">
+                      <a:duotone>
+                        <a:prstClr val="black"/>
+                        <a:schemeClr val="accent3">
+                          <a:tint val="45000"/>
+                          <a:satMod val="400000"/>
+                        </a:schemeClr>
+                      </a:duotone>
+                      <a:extLst>
+                        <a:ext uri="{28A0092B-C50C-407E-A947-70E740481C1C}">
+                          <a14:useLocalDpi xmlns:a14="http://schemas.microsoft.com/office/drawing/2010/main" val="0"/>
+                        </a:ext>
+                      </a:extLst>
+                    </a:blip>
+                    <a:srcRect/>
+                    <a:stretch>
+                      <a:fillRect/>
+                    </a:stretch>
+                  </p:blipFill>
+                  <p:spPr bwMode="auto">
+                    <a:xfrm>
+                      <a:off x="-7202673" y="635036"/>
+                      <a:ext cx="2529195" cy="2529190"/>
+                    </a:xfrm>
+                    <a:prstGeom prst="rect">
+                      <a:avLst/>
+                    </a:prstGeom>
+                    <a:noFill/>
+                    <a:extLst>
+                      <a:ext uri="{909E8E84-426E-40DD-AFC4-6F175D3DCCD1}">
+                        <a14:hiddenFill xmlns:a14="http://schemas.microsoft.com/office/drawing/2010/main">
+                          <a:solidFill>
+                            <a:srgbClr val="FFFFFF"/>
+                          </a:solidFill>
+                        </a14:hiddenFill>
+                      </a:ext>
+                    </a:extLst>
+                  </p:spPr>
+                </p:pic>
+                <p:pic>
+                  <p:nvPicPr>
+                    <p:cNvPr id="1046" name="Picture 22" descr="NAVER">
+                      <a:extLst>
+                        <a:ext uri="{FF2B5EF4-FFF2-40B4-BE49-F238E27FC236}">
+                          <a16:creationId xmlns:a16="http://schemas.microsoft.com/office/drawing/2014/main" id="{F4614A2D-0CCC-9798-C9BF-4B7CE1F8A2D8}"/>
+                        </a:ext>
+                      </a:extLst>
+                    </p:cNvPr>
+                    <p:cNvPicPr>
+                      <a:picLocks noChangeAspect="1" noChangeArrowheads="1"/>
+                    </p:cNvPicPr>
+                    <p:nvPr/>
+                  </p:nvPicPr>
+                  <p:blipFill>
+                    <a:blip r:embed="rId4">
+                      <a:duotone>
+                        <a:prstClr val="black"/>
+                        <a:schemeClr val="accent3">
+                          <a:tint val="45000"/>
+                          <a:satMod val="400000"/>
+                        </a:schemeClr>
+                      </a:duotone>
+                      <a:extLst>
+                        <a:ext uri="{28A0092B-C50C-407E-A947-70E740481C1C}">
+                          <a14:useLocalDpi xmlns:a14="http://schemas.microsoft.com/office/drawing/2010/main" val="0"/>
+                        </a:ext>
+                      </a:extLst>
+                    </a:blip>
+                    <a:srcRect/>
+                    <a:stretch>
+                      <a:fillRect/>
+                    </a:stretch>
+                  </p:blipFill>
+                  <p:spPr bwMode="auto">
+                    <a:xfrm>
+                      <a:off x="-5475229" y="2279859"/>
+                      <a:ext cx="2143128" cy="2143122"/>
+                    </a:xfrm>
+                    <a:prstGeom prst="rect">
+                      <a:avLst/>
+                    </a:prstGeom>
+                    <a:noFill/>
+                    <a:effectLst>
+                      <a:softEdge rad="25400"/>
+                    </a:effectLst>
+                    <a:extLst>
+                      <a:ext uri="{909E8E84-426E-40DD-AFC4-6F175D3DCCD1}">
+                        <a14:hiddenFill xmlns:a14="http://schemas.microsoft.com/office/drawing/2010/main">
+                          <a:solidFill>
+                            <a:srgbClr val="FFFFFF"/>
+                          </a:solidFill>
+                        </a14:hiddenFill>
+                      </a:ext>
+                    </a:extLst>
+                  </p:spPr>
+                </p:pic>
+              </p:grpSp>
+              <p:sp>
+                <p:nvSpPr>
+                  <p:cNvPr id="11" name="TextBox 10">
+                    <a:extLst>
+                      <a:ext uri="{FF2B5EF4-FFF2-40B4-BE49-F238E27FC236}">
+                        <a16:creationId xmlns:a16="http://schemas.microsoft.com/office/drawing/2014/main" id="{825D980A-B1BB-5ECA-E27D-6A825DEAF30F}"/>
+                      </a:ext>
+                    </a:extLst>
+                  </p:cNvPr>
+                  <p:cNvSpPr txBox="1"/>
+                  <p:nvPr/>
+                </p:nvSpPr>
+                <p:spPr>
+                  <a:xfrm>
+                    <a:off x="3452948" y="1280059"/>
+                    <a:ext cx="1603324" cy="646331"/>
+                  </a:xfrm>
+                  <a:prstGeom prst="rect">
+                    <a:avLst/>
+                  </a:prstGeom>
+                  <a:noFill/>
+                </p:spPr>
+                <p:txBody>
+                  <a:bodyPr wrap="none" rtlCol="0">
+                    <a:spAutoFit/>
+                  </a:bodyPr>
+                  <a:lstStyle/>
+                  <a:p>
+                    <a:pPr algn="ctr"/>
+                    <a:r>
+                      <a:rPr lang="en-US" altLang="ko-KR" b="1" dirty="0"/>
+                      <a:t>Client</a:t>
+                    </a:r>
+                    <a:endParaRPr lang="en-US" altLang="ko-KR" sz="1800" b="1" dirty="0">
+                      <a:solidFill>
+                        <a:schemeClr val="tx1"/>
+                      </a:solidFill>
+                    </a:endParaRPr>
+                  </a:p>
+                  <a:p>
+                    <a:pPr algn="ctr"/>
+                    <a:r>
+                      <a:rPr lang="en-US" altLang="ko-KR" sz="1800" b="1" dirty="0">
+                        <a:solidFill>
+                          <a:schemeClr val="tx1"/>
+                        </a:solidFill>
+                      </a:rPr>
+                      <a:t>(Application)</a:t>
+                    </a:r>
+                    <a:endParaRPr lang="ko-KR" altLang="en-US" sz="1800" b="1" dirty="0">
+                      <a:solidFill>
+                        <a:schemeClr val="tx1"/>
+                      </a:solidFill>
+                    </a:endParaRPr>
+                  </a:p>
+                </p:txBody>
+              </p:sp>
+              <p:sp>
+                <p:nvSpPr>
+                  <p:cNvPr id="12" name="TextBox 11">
+                    <a:extLst>
+                      <a:ext uri="{FF2B5EF4-FFF2-40B4-BE49-F238E27FC236}">
+                        <a16:creationId xmlns:a16="http://schemas.microsoft.com/office/drawing/2014/main" id="{28FAE479-DEF0-CADA-5E16-ADF240E69704}"/>
+                      </a:ext>
+                    </a:extLst>
+                  </p:cNvPr>
+                  <p:cNvSpPr txBox="1"/>
+                  <p:nvPr/>
+                </p:nvSpPr>
+                <p:spPr>
+                  <a:xfrm>
+                    <a:off x="9253749" y="1250690"/>
+                    <a:ext cx="2693404" cy="671223"/>
+                  </a:xfrm>
+                  <a:prstGeom prst="rect">
+                    <a:avLst/>
+                  </a:prstGeom>
+                  <a:noFill/>
+                </p:spPr>
+                <p:txBody>
+                  <a:bodyPr wrap="none" rtlCol="0">
+                    <a:spAutoFit/>
+                  </a:bodyPr>
+                  <a:lstStyle/>
+                  <a:p>
+                    <a:pPr algn="ctr"/>
+                    <a:r>
+                      <a:rPr lang="en-US" altLang="ko-KR" sz="1800" b="1" dirty="0">
+                        <a:solidFill>
+                          <a:schemeClr val="tx1"/>
+                        </a:solidFill>
+                      </a:rPr>
+                      <a:t>Server</a:t>
+                    </a:r>
+                  </a:p>
+                  <a:p>
+                    <a:pPr algn="ctr"/>
+                    <a:r>
+                      <a:rPr lang="en-US" altLang="ko-KR" sz="1800" b="1" dirty="0">
+                        <a:solidFill>
+                          <a:schemeClr val="tx1"/>
+                        </a:solidFill>
+                      </a:rPr>
+                      <a:t>(Authorization Server)</a:t>
+                    </a:r>
+                    <a:endParaRPr lang="ko-KR" altLang="en-US" sz="1800" b="1" dirty="0">
+                      <a:solidFill>
+                        <a:schemeClr val="tx1"/>
+                      </a:solidFill>
+                    </a:endParaRPr>
+                  </a:p>
+                </p:txBody>
+              </p:sp>
+              <p:sp>
+                <p:nvSpPr>
+                  <p:cNvPr id="13" name="TextBox 12">
+                    <a:extLst>
+                      <a:ext uri="{FF2B5EF4-FFF2-40B4-BE49-F238E27FC236}">
+                        <a16:creationId xmlns:a16="http://schemas.microsoft.com/office/drawing/2014/main" id="{1164B2FA-B302-80F7-BCE6-EA8AA83998F2}"/>
+                      </a:ext>
+                    </a:extLst>
+                  </p:cNvPr>
+                  <p:cNvSpPr txBox="1"/>
+                  <p:nvPr/>
+                </p:nvSpPr>
+                <p:spPr>
+                  <a:xfrm>
+                    <a:off x="6166887" y="1299638"/>
+                    <a:ext cx="2008883" cy="646330"/>
+                  </a:xfrm>
+                  <a:prstGeom prst="rect">
+                    <a:avLst/>
+                  </a:prstGeom>
+                  <a:noFill/>
+                </p:spPr>
+                <p:txBody>
+                  <a:bodyPr wrap="none" rtlCol="0">
+                    <a:spAutoFit/>
+                  </a:bodyPr>
+                  <a:lstStyle/>
+                  <a:p>
+                    <a:pPr algn="ctr"/>
+                    <a:r>
+                      <a:rPr lang="en-US" altLang="ko-KR" sz="1800" b="1" dirty="0">
+                        <a:solidFill>
+                          <a:schemeClr val="tx1"/>
+                        </a:solidFill>
+                      </a:rPr>
+                      <a:t>External Server</a:t>
+                    </a:r>
+                  </a:p>
+                  <a:p>
+                    <a:pPr algn="ctr"/>
+                    <a:r>
+                      <a:rPr lang="en-US" altLang="ko-KR" sz="1800" b="1" dirty="0">
+                        <a:solidFill>
+                          <a:schemeClr val="tx1"/>
+                        </a:solidFill>
+                      </a:rPr>
+                      <a:t>(</a:t>
+                    </a:r>
+                    <a:r>
+                      <a:rPr lang="en-US" altLang="ko-KR" sz="1800" b="1" dirty="0" err="1">
+                        <a:solidFill>
+                          <a:schemeClr val="tx1"/>
+                        </a:solidFill>
+                      </a:rPr>
+                      <a:t>Resoure</a:t>
+                    </a:r>
+                    <a:r>
+                      <a:rPr lang="en-US" altLang="ko-KR" sz="1800" b="1" dirty="0">
+                        <a:solidFill>
+                          <a:schemeClr val="tx1"/>
+                        </a:solidFill>
+                      </a:rPr>
+                      <a:t> Server)</a:t>
+                    </a:r>
+                    <a:endParaRPr lang="ko-KR" altLang="en-US" sz="1800" b="1" dirty="0">
+                      <a:solidFill>
+                        <a:schemeClr val="tx1"/>
+                      </a:solidFill>
+                    </a:endParaRPr>
+                  </a:p>
+                </p:txBody>
+              </p:sp>
+              <p:cxnSp>
+                <p:nvCxnSpPr>
+                  <p:cNvPr id="19" name="직선 연결선 18">
+                    <a:extLst>
+                      <a:ext uri="{FF2B5EF4-FFF2-40B4-BE49-F238E27FC236}">
+                        <a16:creationId xmlns:a16="http://schemas.microsoft.com/office/drawing/2014/main" id="{DDAF0D79-184F-8BB1-6053-4BB52DBDB443}"/>
+                      </a:ext>
+                    </a:extLst>
+                  </p:cNvPr>
+                  <p:cNvCxnSpPr>
+                    <a:cxnSpLocks/>
+                  </p:cNvCxnSpPr>
+                  <p:nvPr/>
+                </p:nvCxnSpPr>
+                <p:spPr>
+                  <a:xfrm>
+                    <a:off x="1594679" y="1934246"/>
+                    <a:ext cx="17305" cy="4391140"/>
+                  </a:xfrm>
+                  <a:prstGeom prst="line">
+                    <a:avLst/>
+                  </a:prstGeom>
+                </p:spPr>
+                <p:style>
+                  <a:lnRef idx="1">
+                    <a:schemeClr val="dk1"/>
+                  </a:lnRef>
+                  <a:fillRef idx="0">
+                    <a:schemeClr val="dk1"/>
+                  </a:fillRef>
+                  <a:effectRef idx="0">
+                    <a:schemeClr val="dk1"/>
+                  </a:effectRef>
+                  <a:fontRef idx="minor">
+                    <a:schemeClr val="tx1"/>
+                  </a:fontRef>
+                </p:style>
+              </p:cxnSp>
+              <p:cxnSp>
+                <p:nvCxnSpPr>
+                  <p:cNvPr id="20" name="직선 연결선 19">
+                    <a:extLst>
+                      <a:ext uri="{FF2B5EF4-FFF2-40B4-BE49-F238E27FC236}">
+                        <a16:creationId xmlns:a16="http://schemas.microsoft.com/office/drawing/2014/main" id="{8B2E8F1B-C929-9BBF-0067-854A3F4AB165}"/>
+                      </a:ext>
+                    </a:extLst>
+                  </p:cNvPr>
+                  <p:cNvCxnSpPr>
+                    <a:cxnSpLocks/>
+                  </p:cNvCxnSpPr>
+                  <p:nvPr/>
+                </p:nvCxnSpPr>
+                <p:spPr>
+                  <a:xfrm>
+                    <a:off x="4245182" y="1973524"/>
+                    <a:ext cx="0" cy="4392590"/>
+                  </a:xfrm>
+                  <a:prstGeom prst="line">
+                    <a:avLst/>
+                  </a:prstGeom>
+                </p:spPr>
+                <p:style>
+                  <a:lnRef idx="1">
+                    <a:schemeClr val="dk1"/>
+                  </a:lnRef>
+                  <a:fillRef idx="0">
+                    <a:schemeClr val="dk1"/>
+                  </a:fillRef>
+                  <a:effectRef idx="0">
+                    <a:schemeClr val="dk1"/>
+                  </a:effectRef>
+                  <a:fontRef idx="minor">
+                    <a:schemeClr val="tx1"/>
+                  </a:fontRef>
+                </p:style>
+              </p:cxnSp>
+              <p:cxnSp>
+                <p:nvCxnSpPr>
+                  <p:cNvPr id="21" name="직선 연결선 20">
+                    <a:extLst>
+                      <a:ext uri="{FF2B5EF4-FFF2-40B4-BE49-F238E27FC236}">
+                        <a16:creationId xmlns:a16="http://schemas.microsoft.com/office/drawing/2014/main" id="{821CC422-E12A-59D7-8511-144DD7E19F55}"/>
+                      </a:ext>
+                    </a:extLst>
+                  </p:cNvPr>
+                  <p:cNvCxnSpPr>
+                    <a:cxnSpLocks/>
+                    <a:stCxn id="12" idx="2"/>
+                  </p:cNvCxnSpPr>
+                  <p:nvPr/>
+                </p:nvCxnSpPr>
+                <p:spPr>
+                  <a:xfrm>
+                    <a:off x="10600451" y="1921913"/>
+                    <a:ext cx="0" cy="4512731"/>
+                  </a:xfrm>
+                  <a:prstGeom prst="line">
+                    <a:avLst/>
+                  </a:prstGeom>
+                </p:spPr>
+                <p:style>
+                  <a:lnRef idx="1">
+                    <a:schemeClr val="dk1"/>
+                  </a:lnRef>
+                  <a:fillRef idx="0">
+                    <a:schemeClr val="dk1"/>
+                  </a:fillRef>
+                  <a:effectRef idx="0">
+                    <a:schemeClr val="dk1"/>
+                  </a:effectRef>
+                  <a:fontRef idx="minor">
+                    <a:schemeClr val="tx1"/>
+                  </a:fontRef>
+                </p:style>
+              </p:cxnSp>
+              <p:cxnSp>
+                <p:nvCxnSpPr>
+                  <p:cNvPr id="22" name="직선 연결선 21">
+                    <a:extLst>
+                      <a:ext uri="{FF2B5EF4-FFF2-40B4-BE49-F238E27FC236}">
+                        <a16:creationId xmlns:a16="http://schemas.microsoft.com/office/drawing/2014/main" id="{38E718D3-96E0-CD65-ADD9-CD4CC3A0FB35}"/>
+                      </a:ext>
+                    </a:extLst>
+                  </p:cNvPr>
+                  <p:cNvCxnSpPr>
+                    <a:cxnSpLocks/>
+                  </p:cNvCxnSpPr>
+                  <p:nvPr/>
+                </p:nvCxnSpPr>
+                <p:spPr>
+                  <a:xfrm>
+                    <a:off x="7237315" y="1955397"/>
+                    <a:ext cx="0" cy="4489036"/>
+                  </a:xfrm>
+                  <a:prstGeom prst="line">
+                    <a:avLst/>
+                  </a:prstGeom>
+                </p:spPr>
+                <p:style>
+                  <a:lnRef idx="1">
+                    <a:schemeClr val="dk1"/>
+                  </a:lnRef>
+                  <a:fillRef idx="0">
+                    <a:schemeClr val="dk1"/>
+                  </a:fillRef>
+                  <a:effectRef idx="0">
+                    <a:schemeClr val="dk1"/>
+                  </a:effectRef>
+                  <a:fontRef idx="minor">
+                    <a:schemeClr val="tx1"/>
+                  </a:fontRef>
+                </p:style>
+              </p:cxnSp>
+              <p:cxnSp>
+                <p:nvCxnSpPr>
+                  <p:cNvPr id="24" name="직선 화살표 연결선 23">
+                    <a:extLst>
+                      <a:ext uri="{FF2B5EF4-FFF2-40B4-BE49-F238E27FC236}">
+                        <a16:creationId xmlns:a16="http://schemas.microsoft.com/office/drawing/2014/main" id="{5002C3A0-B5C6-33AC-9979-E38D4815D03A}"/>
+                      </a:ext>
+                    </a:extLst>
+                  </p:cNvPr>
+                  <p:cNvCxnSpPr/>
+                  <p:nvPr/>
+                </p:nvCxnSpPr>
+                <p:spPr>
+                  <a:xfrm>
+                    <a:off x="1602557" y="2290713"/>
+                    <a:ext cx="2611224" cy="0"/>
+                  </a:xfrm>
+                  <a:prstGeom prst="straightConnector1">
+                    <a:avLst/>
+                  </a:prstGeom>
+                  <a:ln>
+                    <a:tailEnd type="triangle"/>
+                  </a:ln>
+                </p:spPr>
+                <p:style>
+                  <a:lnRef idx="2">
+                    <a:schemeClr val="dk1"/>
+                  </a:lnRef>
+                  <a:fillRef idx="0">
+                    <a:schemeClr val="dk1"/>
+                  </a:fillRef>
+                  <a:effectRef idx="1">
+                    <a:schemeClr val="dk1"/>
+                  </a:effectRef>
+                  <a:fontRef idx="minor">
+                    <a:schemeClr val="tx1"/>
+                  </a:fontRef>
+                </p:style>
+              </p:cxnSp>
+              <p:sp>
+                <p:nvSpPr>
+                  <p:cNvPr id="25" name="TextBox 24">
+                    <a:extLst>
+                      <a:ext uri="{FF2B5EF4-FFF2-40B4-BE49-F238E27FC236}">
+                        <a16:creationId xmlns:a16="http://schemas.microsoft.com/office/drawing/2014/main" id="{EEBD8D9E-85AB-CC23-3F0E-A909FF41E42E}"/>
+                      </a:ext>
+                    </a:extLst>
+                  </p:cNvPr>
+                  <p:cNvSpPr txBox="1"/>
+                  <p:nvPr/>
+                </p:nvSpPr>
+                <p:spPr>
+                  <a:xfrm>
+                    <a:off x="2234152" y="2108347"/>
+                    <a:ext cx="1329180" cy="351592"/>
+                  </a:xfrm>
+                  <a:prstGeom prst="rect">
+                    <a:avLst/>
+                  </a:prstGeom>
+                  <a:solidFill>
+                    <a:schemeClr val="bg1"/>
+                  </a:solidFill>
+                </p:spPr>
+                <p:txBody>
+                  <a:bodyPr wrap="square" rtlCol="0">
+                    <a:spAutoFit/>
+                  </a:bodyPr>
+                  <a:lstStyle/>
+                  <a:p>
+                    <a:pPr algn="ctr"/>
+                    <a:r>
+                      <a:rPr lang="ko-KR" altLang="en-US" sz="1200" dirty="0"/>
+                      <a:t>사용 요청</a:t>
+                    </a:r>
+                    <a:r>
+                      <a:rPr lang="ko-KR" altLang="en-US" sz="1600" dirty="0"/>
+                      <a:t> </a:t>
+                    </a:r>
+                  </a:p>
+                </p:txBody>
+              </p:sp>
+              <p:cxnSp>
+                <p:nvCxnSpPr>
+                  <p:cNvPr id="26" name="직선 화살표 연결선 25">
+                    <a:extLst>
+                      <a:ext uri="{FF2B5EF4-FFF2-40B4-BE49-F238E27FC236}">
+                        <a16:creationId xmlns:a16="http://schemas.microsoft.com/office/drawing/2014/main" id="{B08A9F93-04DF-65E7-4599-AE2A70297CE5}"/>
+                      </a:ext>
+                    </a:extLst>
+                  </p:cNvPr>
+                  <p:cNvCxnSpPr>
+                    <a:cxnSpLocks/>
+                  </p:cNvCxnSpPr>
+                  <p:nvPr/>
+                </p:nvCxnSpPr>
+                <p:spPr>
+                  <a:xfrm>
+                    <a:off x="4243633" y="2499674"/>
+                    <a:ext cx="2939592" cy="0"/>
+                  </a:xfrm>
+                  <a:prstGeom prst="straightConnector1">
+                    <a:avLst/>
+                  </a:prstGeom>
+                  <a:ln>
+                    <a:tailEnd type="triangle"/>
+                  </a:ln>
+                </p:spPr>
+                <p:style>
+                  <a:lnRef idx="2">
+                    <a:schemeClr val="dk1"/>
+                  </a:lnRef>
+                  <a:fillRef idx="0">
+                    <a:schemeClr val="dk1"/>
+                  </a:fillRef>
+                  <a:effectRef idx="1">
+                    <a:schemeClr val="dk1"/>
+                  </a:effectRef>
+                  <a:fontRef idx="minor">
+                    <a:schemeClr val="tx1"/>
+                  </a:fontRef>
+                </p:style>
+              </p:cxnSp>
+              <p:sp>
+                <p:nvSpPr>
+                  <p:cNvPr id="28" name="TextBox 27">
+                    <a:extLst>
+                      <a:ext uri="{FF2B5EF4-FFF2-40B4-BE49-F238E27FC236}">
+                        <a16:creationId xmlns:a16="http://schemas.microsoft.com/office/drawing/2014/main" id="{ADBE230E-242B-7011-0895-B1EE8807D387}"/>
+                      </a:ext>
+                    </a:extLst>
+                  </p:cNvPr>
+                  <p:cNvSpPr txBox="1"/>
+                  <p:nvPr/>
+                </p:nvSpPr>
+                <p:spPr>
+                  <a:xfrm>
+                    <a:off x="4748758" y="2354654"/>
+                    <a:ext cx="1978064" cy="287667"/>
+                  </a:xfrm>
+                  <a:prstGeom prst="rect">
+                    <a:avLst/>
+                  </a:prstGeom>
+                  <a:solidFill>
+                    <a:schemeClr val="bg1"/>
+                  </a:solidFill>
+                </p:spPr>
+                <p:txBody>
+                  <a:bodyPr wrap="square" rtlCol="0">
+                    <a:spAutoFit/>
+                  </a:bodyPr>
+                  <a:lstStyle/>
+                  <a:p>
+                    <a:pPr algn="ctr"/>
+                    <a:r>
+                      <a:rPr lang="ko-KR" altLang="en-US" sz="1200" dirty="0"/>
+                      <a:t>권한 부여 승인 코드 요청 </a:t>
+                    </a:r>
+                  </a:p>
+                </p:txBody>
+              </p:sp>
+              <p:sp>
+                <p:nvSpPr>
+                  <p:cNvPr id="29" name="사각형: 위쪽 모서리의 한쪽은 둥글고 다른 한쪽은 잘림 28">
+                    <a:extLst>
+                      <a:ext uri="{FF2B5EF4-FFF2-40B4-BE49-F238E27FC236}">
+                        <a16:creationId xmlns:a16="http://schemas.microsoft.com/office/drawing/2014/main" id="{397A513D-0AAC-F63D-8AAE-291AD1F7C54E}"/>
+                      </a:ext>
+                    </a:extLst>
+                  </p:cNvPr>
+                  <p:cNvSpPr/>
+                  <p:nvPr/>
+                </p:nvSpPr>
+                <p:spPr>
+                  <a:xfrm>
+                    <a:off x="7522589" y="2469820"/>
+                    <a:ext cx="2610987" cy="612745"/>
+                  </a:xfrm>
+                  <a:prstGeom prst="snipRoundRect">
+                    <a:avLst/>
+                  </a:prstGeom>
+                  <a:solidFill>
+                    <a:schemeClr val="bg1"/>
+                  </a:solidFill>
+                  <a:ln>
+                    <a:solidFill>
+                      <a:schemeClr val="tx1"/>
+                    </a:solidFill>
+                  </a:ln>
+                </p:spPr>
+                <p:style>
+                  <a:lnRef idx="2">
+                    <a:schemeClr val="accent1">
+                      <a:shade val="50000"/>
+                    </a:schemeClr>
+                  </a:lnRef>
+                  <a:fillRef idx="1">
+                    <a:schemeClr val="accent1"/>
+                  </a:fillRef>
+                  <a:effectRef idx="0">
+                    <a:schemeClr val="accent1"/>
+                  </a:effectRef>
+                  <a:fontRef idx="minor">
+                    <a:schemeClr val="lt1"/>
+                  </a:fontRef>
+                </p:style>
+                <p:txBody>
+                  <a:bodyPr rtlCol="0" anchor="ctr"/>
+                  <a:lstStyle/>
+                  <a:p>
+                    <a:pPr algn="ctr"/>
+                    <a:r>
+                      <a:rPr lang="ko-KR" altLang="en-US" sz="1050" dirty="0">
+                        <a:solidFill>
+                          <a:schemeClr val="tx1"/>
+                        </a:solidFill>
+                      </a:rPr>
+                      <a:t>요청에 포함되는 파라미터 </a:t>
+                    </a:r>
+                    <a:endParaRPr lang="en-US" altLang="ko-KR" sz="1050" dirty="0">
+                      <a:solidFill>
+                        <a:schemeClr val="tx1"/>
+                      </a:solidFill>
+                    </a:endParaRPr>
+                  </a:p>
+                  <a:p>
+                    <a:pPr algn="ctr"/>
+                    <a:r>
+                      <a:rPr lang="en-US" altLang="ko-KR" sz="1050" dirty="0">
+                        <a:solidFill>
+                          <a:schemeClr val="tx1"/>
+                        </a:solidFill>
+                      </a:rPr>
+                      <a:t>(</a:t>
+                    </a:r>
+                    <a:r>
+                      <a:rPr lang="en-US" altLang="ko-KR" sz="1050" dirty="0" err="1">
+                        <a:solidFill>
+                          <a:schemeClr val="tx1"/>
+                        </a:solidFill>
+                      </a:rPr>
+                      <a:t>Client_id</a:t>
+                    </a:r>
+                    <a:r>
+                      <a:rPr lang="en-US" altLang="ko-KR" sz="1050" dirty="0">
+                        <a:solidFill>
+                          <a:schemeClr val="tx1"/>
+                        </a:solidFill>
+                      </a:rPr>
+                      <a:t>, </a:t>
+                    </a:r>
+                    <a:r>
+                      <a:rPr lang="en-US" altLang="ko-KR" sz="1050" dirty="0" err="1">
+                        <a:solidFill>
+                          <a:schemeClr val="tx1"/>
+                        </a:solidFill>
+                      </a:rPr>
+                      <a:t>redirect_url</a:t>
+                    </a:r>
+                    <a:r>
+                      <a:rPr lang="en-US" altLang="ko-KR" sz="1050" dirty="0">
+                        <a:solidFill>
+                          <a:schemeClr val="tx1"/>
+                        </a:solidFill>
+                      </a:rPr>
+                      <a:t>, </a:t>
+                    </a:r>
+                    <a:r>
+                      <a:rPr lang="en-US" altLang="ko-KR" sz="1050" dirty="0" err="1">
+                        <a:solidFill>
+                          <a:schemeClr val="tx1"/>
+                        </a:solidFill>
+                      </a:rPr>
+                      <a:t>response_type</a:t>
+                    </a:r>
+                    <a:r>
+                      <a:rPr lang="en-US" altLang="ko-KR" sz="1050" dirty="0">
+                        <a:solidFill>
+                          <a:schemeClr val="tx1"/>
+                        </a:solidFill>
+                      </a:rPr>
+                      <a:t>=code)</a:t>
+                    </a:r>
+                    <a:endParaRPr lang="ko-KR" altLang="en-US" sz="1050" dirty="0">
+                      <a:solidFill>
+                        <a:schemeClr val="tx1"/>
+                      </a:solidFill>
+                    </a:endParaRPr>
+                  </a:p>
+                </p:txBody>
+              </p:sp>
+              <p:sp>
+                <p:nvSpPr>
+                  <p:cNvPr id="30" name="사각형: 위쪽 모서리의 한쪽은 둥글고 다른 한쪽은 잘림 29">
+                    <a:extLst>
+                      <a:ext uri="{FF2B5EF4-FFF2-40B4-BE49-F238E27FC236}">
+                        <a16:creationId xmlns:a16="http://schemas.microsoft.com/office/drawing/2014/main" id="{0D9E5532-0068-060B-FD6D-2E34C315AA68}"/>
+                      </a:ext>
+                    </a:extLst>
+                  </p:cNvPr>
+                  <p:cNvSpPr/>
+                  <p:nvPr/>
+                </p:nvSpPr>
+                <p:spPr>
+                  <a:xfrm>
+                    <a:off x="7503734" y="3195684"/>
+                    <a:ext cx="1442303" cy="395925"/>
+                  </a:xfrm>
+                  <a:prstGeom prst="snipRoundRect">
+                    <a:avLst/>
+                  </a:prstGeom>
+                  <a:solidFill>
+                    <a:schemeClr val="bg1"/>
+                  </a:solidFill>
+                  <a:ln>
+                    <a:solidFill>
+                      <a:schemeClr val="tx1"/>
+                    </a:solidFill>
+                  </a:ln>
+                </p:spPr>
+                <p:style>
+                  <a:lnRef idx="2">
+                    <a:schemeClr val="accent1">
+                      <a:shade val="50000"/>
+                    </a:schemeClr>
+                  </a:lnRef>
+                  <a:fillRef idx="1">
+                    <a:schemeClr val="accent1"/>
+                  </a:fillRef>
+                  <a:effectRef idx="0">
+                    <a:schemeClr val="accent1"/>
+                  </a:effectRef>
+                  <a:fontRef idx="minor">
+                    <a:schemeClr val="lt1"/>
+                  </a:fontRef>
+                </p:style>
+                <p:txBody>
+                  <a:bodyPr rtlCol="0" anchor="ctr"/>
+                  <a:lstStyle/>
+                  <a:p>
+                    <a:pPr algn="ctr"/>
+                    <a:r>
+                      <a:rPr lang="ko-KR" altLang="en-US" sz="1100" dirty="0">
+                        <a:solidFill>
+                          <a:schemeClr val="tx1"/>
+                        </a:solidFill>
+                      </a:rPr>
+                      <a:t>로그인 팝업 출력</a:t>
+                    </a:r>
+                  </a:p>
+                </p:txBody>
+              </p:sp>
+              <p:cxnSp>
+                <p:nvCxnSpPr>
+                  <p:cNvPr id="33" name="직선 화살표 연결선 32">
+                    <a:extLst>
+                      <a:ext uri="{FF2B5EF4-FFF2-40B4-BE49-F238E27FC236}">
+                        <a16:creationId xmlns:a16="http://schemas.microsoft.com/office/drawing/2014/main" id="{0BF2436A-1FC4-3DBB-5EB6-0671D4D60D07}"/>
+                      </a:ext>
+                    </a:extLst>
+                  </p:cNvPr>
+                  <p:cNvCxnSpPr>
+                    <a:cxnSpLocks/>
+                  </p:cNvCxnSpPr>
+                  <p:nvPr/>
+                </p:nvCxnSpPr>
+                <p:spPr>
+                  <a:xfrm>
+                    <a:off x="1613555" y="3715728"/>
+                    <a:ext cx="5569670" cy="0"/>
+                  </a:xfrm>
+                  <a:prstGeom prst="straightConnector1">
+                    <a:avLst/>
+                  </a:prstGeom>
+                  <a:ln>
+                    <a:tailEnd type="triangle"/>
+                  </a:ln>
+                </p:spPr>
+                <p:style>
+                  <a:lnRef idx="2">
+                    <a:schemeClr val="dk1"/>
+                  </a:lnRef>
+                  <a:fillRef idx="0">
+                    <a:schemeClr val="dk1"/>
+                  </a:fillRef>
+                  <a:effectRef idx="1">
+                    <a:schemeClr val="dk1"/>
+                  </a:effectRef>
+                  <a:fontRef idx="minor">
+                    <a:schemeClr val="tx1"/>
+                  </a:fontRef>
+                </p:style>
+              </p:cxnSp>
+              <p:sp>
+                <p:nvSpPr>
+                  <p:cNvPr id="34" name="TextBox 33">
+                    <a:extLst>
+                      <a:ext uri="{FF2B5EF4-FFF2-40B4-BE49-F238E27FC236}">
+                        <a16:creationId xmlns:a16="http://schemas.microsoft.com/office/drawing/2014/main" id="{BC971A49-BD93-71E9-4417-5087155A9C0B}"/>
+                      </a:ext>
+                    </a:extLst>
+                  </p:cNvPr>
+                  <p:cNvSpPr txBox="1"/>
+                  <p:nvPr/>
+                </p:nvSpPr>
+                <p:spPr>
+                  <a:xfrm>
+                    <a:off x="3612037" y="3552946"/>
+                    <a:ext cx="1329180" cy="338554"/>
+                  </a:xfrm>
+                  <a:prstGeom prst="rect">
+                    <a:avLst/>
+                  </a:prstGeom>
+                  <a:solidFill>
+                    <a:schemeClr val="bg1"/>
+                  </a:solidFill>
+                </p:spPr>
+                <p:txBody>
+                  <a:bodyPr wrap="square" rtlCol="0">
+                    <a:spAutoFit/>
+                  </a:bodyPr>
+                  <a:lstStyle/>
+                  <a:p>
+                    <a:pPr algn="ctr"/>
+                    <a:r>
+                      <a:rPr lang="ko-KR" altLang="en-US" sz="1200" dirty="0"/>
+                      <a:t>간편 로그인</a:t>
+                    </a:r>
+                    <a:r>
+                      <a:rPr lang="ko-KR" altLang="en-US" sz="1600" dirty="0"/>
+                      <a:t> </a:t>
+                    </a:r>
+                  </a:p>
+                </p:txBody>
+              </p:sp>
+              <p:cxnSp>
+                <p:nvCxnSpPr>
+                  <p:cNvPr id="37" name="직선 화살표 연결선 36">
+                    <a:extLst>
+                      <a:ext uri="{FF2B5EF4-FFF2-40B4-BE49-F238E27FC236}">
+                        <a16:creationId xmlns:a16="http://schemas.microsoft.com/office/drawing/2014/main" id="{EF3C01B5-D3E4-A43E-9C2D-A3CA0CED5AAD}"/>
+                      </a:ext>
+                    </a:extLst>
+                  </p:cNvPr>
+                  <p:cNvCxnSpPr>
+                    <a:cxnSpLocks/>
+                  </p:cNvCxnSpPr>
+                  <p:nvPr/>
+                </p:nvCxnSpPr>
+                <p:spPr>
+                  <a:xfrm>
+                    <a:off x="4254631" y="4139691"/>
+                    <a:ext cx="2939592" cy="0"/>
+                  </a:xfrm>
+                  <a:prstGeom prst="straightConnector1">
+                    <a:avLst/>
+                  </a:prstGeom>
+                  <a:ln>
+                    <a:headEnd type="triangle"/>
+                    <a:tailEnd type="none"/>
+                  </a:ln>
+                </p:spPr>
+                <p:style>
+                  <a:lnRef idx="2">
+                    <a:schemeClr val="dk1"/>
+                  </a:lnRef>
+                  <a:fillRef idx="0">
+                    <a:schemeClr val="dk1"/>
+                  </a:fillRef>
+                  <a:effectRef idx="1">
+                    <a:schemeClr val="dk1"/>
+                  </a:effectRef>
+                  <a:fontRef idx="minor">
+                    <a:schemeClr val="tx1"/>
+                  </a:fontRef>
+                </p:style>
+              </p:cxnSp>
+              <p:sp>
+                <p:nvSpPr>
+                  <p:cNvPr id="38" name="TextBox 37">
+                    <a:extLst>
+                      <a:ext uri="{FF2B5EF4-FFF2-40B4-BE49-F238E27FC236}">
+                        <a16:creationId xmlns:a16="http://schemas.microsoft.com/office/drawing/2014/main" id="{EE9277A1-C51A-D2AE-CA08-440294758826}"/>
+                      </a:ext>
+                    </a:extLst>
+                  </p:cNvPr>
+                  <p:cNvSpPr txBox="1"/>
+                  <p:nvPr/>
+                </p:nvSpPr>
+                <p:spPr>
+                  <a:xfrm>
+                    <a:off x="4933354" y="4014253"/>
+                    <a:ext cx="1978064" cy="276999"/>
+                  </a:xfrm>
+                  <a:prstGeom prst="rect">
+                    <a:avLst/>
+                  </a:prstGeom>
+                  <a:solidFill>
+                    <a:schemeClr val="bg1"/>
+                  </a:solidFill>
+                </p:spPr>
+                <p:txBody>
+                  <a:bodyPr wrap="square" rtlCol="0">
+                    <a:spAutoFit/>
+                  </a:bodyPr>
+                  <a:lstStyle/>
+                  <a:p>
+                    <a:pPr algn="ctr"/>
+                    <a:r>
+                      <a:rPr lang="ko-KR" altLang="en-US" sz="1200" dirty="0"/>
+                      <a:t>권한 부여 승인 코드 전달</a:t>
+                    </a:r>
+                  </a:p>
+                </p:txBody>
+              </p:sp>
+              <p:cxnSp>
+                <p:nvCxnSpPr>
+                  <p:cNvPr id="43" name="직선 화살표 연결선 42">
+                    <a:extLst>
+                      <a:ext uri="{FF2B5EF4-FFF2-40B4-BE49-F238E27FC236}">
+                        <a16:creationId xmlns:a16="http://schemas.microsoft.com/office/drawing/2014/main" id="{1BFD4EBA-6208-FBAA-91CE-B54C645C807C}"/>
+                      </a:ext>
+                    </a:extLst>
+                  </p:cNvPr>
+                  <p:cNvCxnSpPr>
+                    <a:cxnSpLocks/>
+                  </p:cNvCxnSpPr>
+                  <p:nvPr/>
+                </p:nvCxnSpPr>
+                <p:spPr>
+                  <a:xfrm>
+                    <a:off x="4245204" y="4659619"/>
+                    <a:ext cx="2939592" cy="0"/>
+                  </a:xfrm>
+                  <a:prstGeom prst="straightConnector1">
+                    <a:avLst/>
+                  </a:prstGeom>
+                  <a:ln>
+                    <a:tailEnd type="triangle"/>
+                  </a:ln>
+                </p:spPr>
+                <p:style>
+                  <a:lnRef idx="2">
+                    <a:schemeClr val="dk1"/>
+                  </a:lnRef>
+                  <a:fillRef idx="0">
+                    <a:schemeClr val="dk1"/>
+                  </a:fillRef>
+                  <a:effectRef idx="1">
+                    <a:schemeClr val="dk1"/>
+                  </a:effectRef>
+                  <a:fontRef idx="minor">
+                    <a:schemeClr val="tx1"/>
+                  </a:fontRef>
+                </p:style>
+              </p:cxnSp>
+              <p:sp>
+                <p:nvSpPr>
+                  <p:cNvPr id="44" name="TextBox 43">
+                    <a:extLst>
+                      <a:ext uri="{FF2B5EF4-FFF2-40B4-BE49-F238E27FC236}">
+                        <a16:creationId xmlns:a16="http://schemas.microsoft.com/office/drawing/2014/main" id="{B41BE4C4-6BA7-863D-4CFC-78B4994385BF}"/>
+                      </a:ext>
+                    </a:extLst>
+                  </p:cNvPr>
+                  <p:cNvSpPr txBox="1"/>
+                  <p:nvPr/>
+                </p:nvSpPr>
+                <p:spPr>
+                  <a:xfrm>
+                    <a:off x="4605876" y="4431938"/>
+                    <a:ext cx="1978064" cy="430887"/>
+                  </a:xfrm>
+                  <a:prstGeom prst="rect">
+                    <a:avLst/>
+                  </a:prstGeom>
+                  <a:solidFill>
+                    <a:schemeClr val="bg1"/>
+                  </a:solidFill>
+                </p:spPr>
+                <p:txBody>
+                  <a:bodyPr wrap="square" rtlCol="0">
+                    <a:spAutoFit/>
+                  </a:bodyPr>
+                  <a:lstStyle/>
+                  <a:p>
+                    <a:pPr algn="ctr"/>
+                    <a:r>
+                      <a:rPr lang="en-US" altLang="ko-KR" sz="1100" dirty="0"/>
+                      <a:t>Access Token </a:t>
+                    </a:r>
+                    <a:r>
+                      <a:rPr lang="ko-KR" altLang="en-US" sz="1100" dirty="0"/>
+                      <a:t>요청</a:t>
+                    </a:r>
+                    <a:endParaRPr lang="en-US" altLang="ko-KR" sz="1100" dirty="0"/>
+                  </a:p>
+                  <a:p>
+                    <a:pPr algn="ctr"/>
+                    <a:r>
+                      <a:rPr lang="en-US" altLang="ko-KR" sz="1100" dirty="0"/>
+                      <a:t>(using</a:t>
+                    </a:r>
+                    <a:r>
+                      <a:rPr lang="ko-KR" altLang="en-US" sz="1100" dirty="0"/>
+                      <a:t> 권한 부여 승인 코드</a:t>
+                    </a:r>
+                    <a:r>
+                      <a:rPr lang="en-US" altLang="ko-KR" sz="1100" dirty="0"/>
+                      <a:t>)</a:t>
+                    </a:r>
+                    <a:endParaRPr lang="ko-KR" altLang="en-US" sz="1100" dirty="0"/>
+                  </a:p>
+                </p:txBody>
+              </p:sp>
+              <p:cxnSp>
+                <p:nvCxnSpPr>
+                  <p:cNvPr id="45" name="직선 화살표 연결선 44">
+                    <a:extLst>
+                      <a:ext uri="{FF2B5EF4-FFF2-40B4-BE49-F238E27FC236}">
+                        <a16:creationId xmlns:a16="http://schemas.microsoft.com/office/drawing/2014/main" id="{B6EE4263-1F63-DBF0-2257-B097D40CC2E9}"/>
+                      </a:ext>
+                    </a:extLst>
+                  </p:cNvPr>
+                  <p:cNvCxnSpPr>
+                    <a:cxnSpLocks/>
+                  </p:cNvCxnSpPr>
+                  <p:nvPr/>
+                </p:nvCxnSpPr>
+                <p:spPr>
+                  <a:xfrm>
+                    <a:off x="4237348" y="5074879"/>
+                    <a:ext cx="2939592" cy="0"/>
+                  </a:xfrm>
+                  <a:prstGeom prst="straightConnector1">
+                    <a:avLst/>
+                  </a:prstGeom>
+                  <a:ln>
+                    <a:headEnd type="triangle"/>
+                    <a:tailEnd type="none"/>
+                  </a:ln>
+                </p:spPr>
+                <p:style>
+                  <a:lnRef idx="2">
+                    <a:schemeClr val="dk1"/>
+                  </a:lnRef>
+                  <a:fillRef idx="0">
+                    <a:schemeClr val="dk1"/>
+                  </a:fillRef>
+                  <a:effectRef idx="1">
+                    <a:schemeClr val="dk1"/>
+                  </a:effectRef>
+                  <a:fontRef idx="minor">
+                    <a:schemeClr val="tx1"/>
+                  </a:fontRef>
+                </p:style>
+              </p:cxnSp>
+              <p:sp>
+                <p:nvSpPr>
+                  <p:cNvPr id="46" name="TextBox 45">
+                    <a:extLst>
+                      <a:ext uri="{FF2B5EF4-FFF2-40B4-BE49-F238E27FC236}">
+                        <a16:creationId xmlns:a16="http://schemas.microsoft.com/office/drawing/2014/main" id="{960FD74D-059E-5F6F-7AC6-C67F11D4DB27}"/>
+                      </a:ext>
+                    </a:extLst>
+                  </p:cNvPr>
+                  <p:cNvSpPr txBox="1"/>
+                  <p:nvPr/>
+                </p:nvSpPr>
+                <p:spPr>
+                  <a:xfrm>
+                    <a:off x="4916071" y="4939650"/>
+                    <a:ext cx="1978064" cy="276999"/>
+                  </a:xfrm>
+                  <a:prstGeom prst="rect">
+                    <a:avLst/>
+                  </a:prstGeom>
+                  <a:solidFill>
+                    <a:schemeClr val="bg1"/>
+                  </a:solidFill>
+                </p:spPr>
+                <p:txBody>
+                  <a:bodyPr wrap="square" rtlCol="0">
+                    <a:spAutoFit/>
+                  </a:bodyPr>
+                  <a:lstStyle/>
+                  <a:p>
+                    <a:pPr algn="ctr"/>
+                    <a:r>
+                      <a:rPr lang="en-US" altLang="ko-KR" sz="1200" dirty="0"/>
+                      <a:t>Access</a:t>
+                    </a:r>
+                    <a:r>
+                      <a:rPr lang="ko-KR" altLang="en-US" sz="1200" dirty="0"/>
+                      <a:t> </a:t>
+                    </a:r>
+                    <a:r>
+                      <a:rPr lang="en-US" altLang="ko-KR" sz="1200" dirty="0"/>
+                      <a:t>Token </a:t>
+                    </a:r>
+                    <a:r>
+                      <a:rPr lang="ko-KR" altLang="en-US" sz="1200" dirty="0"/>
+                      <a:t>반환</a:t>
+                    </a:r>
+                  </a:p>
+                </p:txBody>
+              </p:sp>
+              <p:cxnSp>
+                <p:nvCxnSpPr>
+                  <p:cNvPr id="47" name="직선 화살표 연결선 46">
+                    <a:extLst>
+                      <a:ext uri="{FF2B5EF4-FFF2-40B4-BE49-F238E27FC236}">
+                        <a16:creationId xmlns:a16="http://schemas.microsoft.com/office/drawing/2014/main" id="{071FB0D6-3A9C-287F-8F96-B0BFE5D1D074}"/>
+                      </a:ext>
+                    </a:extLst>
+                  </p:cNvPr>
+                  <p:cNvCxnSpPr>
+                    <a:cxnSpLocks/>
+                  </p:cNvCxnSpPr>
+                  <p:nvPr/>
+                </p:nvCxnSpPr>
+                <p:spPr>
+                  <a:xfrm>
+                    <a:off x="4264058" y="5470324"/>
+                    <a:ext cx="6322804" cy="0"/>
+                  </a:xfrm>
+                  <a:prstGeom prst="straightConnector1">
+                    <a:avLst/>
+                  </a:prstGeom>
+                  <a:ln>
+                    <a:tailEnd type="triangle"/>
+                  </a:ln>
+                </p:spPr>
+                <p:style>
+                  <a:lnRef idx="2">
+                    <a:schemeClr val="dk1"/>
+                  </a:lnRef>
+                  <a:fillRef idx="0">
+                    <a:schemeClr val="dk1"/>
+                  </a:fillRef>
+                  <a:effectRef idx="1">
+                    <a:schemeClr val="dk1"/>
+                  </a:effectRef>
+                  <a:fontRef idx="minor">
+                    <a:schemeClr val="tx1"/>
+                  </a:fontRef>
+                </p:style>
+              </p:cxnSp>
+              <p:sp>
+                <p:nvSpPr>
+                  <p:cNvPr id="48" name="TextBox 47">
+                    <a:extLst>
+                      <a:ext uri="{FF2B5EF4-FFF2-40B4-BE49-F238E27FC236}">
+                        <a16:creationId xmlns:a16="http://schemas.microsoft.com/office/drawing/2014/main" id="{1B9164BE-1078-051D-0DE7-23C411EACC57}"/>
+                      </a:ext>
+                    </a:extLst>
+                  </p:cNvPr>
+                  <p:cNvSpPr txBox="1"/>
+                  <p:nvPr/>
+                </p:nvSpPr>
+                <p:spPr>
+                  <a:xfrm>
+                    <a:off x="5722070" y="5334733"/>
+                    <a:ext cx="3337089" cy="276999"/>
+                  </a:xfrm>
+                  <a:prstGeom prst="rect">
+                    <a:avLst/>
+                  </a:prstGeom>
+                  <a:solidFill>
+                    <a:schemeClr val="bg1"/>
+                  </a:solidFill>
+                </p:spPr>
+                <p:txBody>
+                  <a:bodyPr wrap="square" rtlCol="0">
+                    <a:spAutoFit/>
+                  </a:bodyPr>
+                  <a:lstStyle/>
+                  <a:p>
+                    <a:pPr algn="ctr"/>
+                    <a:r>
+                      <a:rPr lang="ko-KR" altLang="en-US" sz="1200" dirty="0"/>
+                      <a:t>보호된 자원 요청 </a:t>
+                    </a:r>
+                    <a:r>
+                      <a:rPr lang="en-US" altLang="ko-KR" sz="1200" dirty="0"/>
+                      <a:t>(using Access Token)</a:t>
+                    </a:r>
+                    <a:endParaRPr lang="ko-KR" altLang="en-US" sz="1600" dirty="0"/>
+                  </a:p>
+                </p:txBody>
+              </p:sp>
+              <p:cxnSp>
+                <p:nvCxnSpPr>
+                  <p:cNvPr id="51" name="직선 화살표 연결선 50">
+                    <a:extLst>
+                      <a:ext uri="{FF2B5EF4-FFF2-40B4-BE49-F238E27FC236}">
+                        <a16:creationId xmlns:a16="http://schemas.microsoft.com/office/drawing/2014/main" id="{59FB65D0-08B1-5A6E-204B-338D475F7AB2}"/>
+                      </a:ext>
+                    </a:extLst>
+                  </p:cNvPr>
+                  <p:cNvCxnSpPr>
+                    <a:cxnSpLocks/>
+                  </p:cNvCxnSpPr>
+                  <p:nvPr/>
+                </p:nvCxnSpPr>
+                <p:spPr>
+                  <a:xfrm>
+                    <a:off x="4237348" y="5839903"/>
+                    <a:ext cx="6359158" cy="0"/>
+                  </a:xfrm>
+                  <a:prstGeom prst="straightConnector1">
+                    <a:avLst/>
+                  </a:prstGeom>
+                  <a:ln>
+                    <a:headEnd type="triangle"/>
+                    <a:tailEnd type="none"/>
+                  </a:ln>
+                </p:spPr>
+                <p:style>
+                  <a:lnRef idx="2">
+                    <a:schemeClr val="dk1"/>
+                  </a:lnRef>
+                  <a:fillRef idx="0">
+                    <a:schemeClr val="dk1"/>
+                  </a:fillRef>
+                  <a:effectRef idx="1">
+                    <a:schemeClr val="dk1"/>
+                  </a:effectRef>
+                  <a:fontRef idx="minor">
+                    <a:schemeClr val="tx1"/>
+                  </a:fontRef>
+                </p:style>
+              </p:cxnSp>
+              <p:sp>
+                <p:nvSpPr>
+                  <p:cNvPr id="52" name="TextBox 51">
+                    <a:extLst>
+                      <a:ext uri="{FF2B5EF4-FFF2-40B4-BE49-F238E27FC236}">
+                        <a16:creationId xmlns:a16="http://schemas.microsoft.com/office/drawing/2014/main" id="{94DE1047-CBD3-B3D9-FE2E-3A171761AB4E}"/>
+                      </a:ext>
+                    </a:extLst>
+                  </p:cNvPr>
+                  <p:cNvSpPr txBox="1"/>
+                  <p:nvPr/>
+                </p:nvSpPr>
+                <p:spPr>
+                  <a:xfrm>
+                    <a:off x="6235830" y="5704313"/>
+                    <a:ext cx="1778524" cy="276999"/>
+                  </a:xfrm>
+                  <a:prstGeom prst="rect">
+                    <a:avLst/>
+                  </a:prstGeom>
+                  <a:solidFill>
+                    <a:schemeClr val="bg1"/>
+                  </a:solidFill>
+                </p:spPr>
+                <p:txBody>
+                  <a:bodyPr wrap="square" rtlCol="0">
+                    <a:spAutoFit/>
+                  </a:bodyPr>
+                  <a:lstStyle/>
+                  <a:p>
+                    <a:pPr algn="ctr"/>
+                    <a:r>
+                      <a:rPr lang="ko-KR" altLang="en-US" sz="1200" dirty="0"/>
+                      <a:t>보호된 자원 반환</a:t>
+                    </a:r>
+                    <a:endParaRPr lang="en-US" altLang="ko-KR" sz="1200" dirty="0"/>
+                  </a:p>
+                </p:txBody>
+              </p:sp>
+            </p:grpSp>
+          </p:grpSp>
+          <p:cxnSp>
+            <p:nvCxnSpPr>
+              <p:cNvPr id="56" name="직선 화살표 연결선 55">
+                <a:extLst>
+                  <a:ext uri="{FF2B5EF4-FFF2-40B4-BE49-F238E27FC236}">
+                    <a16:creationId xmlns:a16="http://schemas.microsoft.com/office/drawing/2014/main" id="{FA456C24-AF2D-DCE3-C155-DD845CAABE41}"/>
+                  </a:ext>
+                </a:extLst>
+              </p:cNvPr>
+              <p:cNvCxnSpPr/>
+              <p:nvPr/>
+            </p:nvCxnSpPr>
+            <p:spPr>
+              <a:xfrm>
+                <a:off x="1645986" y="6022580"/>
+                <a:ext cx="2552318" cy="0"/>
+              </a:xfrm>
+              <a:prstGeom prst="straightConnector1">
+                <a:avLst/>
+              </a:prstGeom>
+              <a:ln>
+                <a:headEnd type="triangle"/>
+                <a:tailEnd type="none"/>
+              </a:ln>
+            </p:spPr>
+            <p:style>
+              <a:lnRef idx="2">
+                <a:schemeClr val="dk1"/>
+              </a:lnRef>
+              <a:fillRef idx="0">
+                <a:schemeClr val="dk1"/>
+              </a:fillRef>
+              <a:effectRef idx="1">
+                <a:schemeClr val="dk1"/>
+              </a:effectRef>
+              <a:fontRef idx="minor">
+                <a:schemeClr val="tx1"/>
+              </a:fontRef>
+            </p:style>
+          </p:cxnSp>
+          <p:sp>
+            <p:nvSpPr>
+              <p:cNvPr id="57" name="TextBox 56">
+                <a:extLst>
+                  <a:ext uri="{FF2B5EF4-FFF2-40B4-BE49-F238E27FC236}">
+                    <a16:creationId xmlns:a16="http://schemas.microsoft.com/office/drawing/2014/main" id="{62B19805-3F83-14E4-DEB5-FCF291430380}"/>
+                  </a:ext>
+                </a:extLst>
+              </p:cNvPr>
+              <p:cNvSpPr txBox="1"/>
+              <p:nvPr/>
+            </p:nvSpPr>
+            <p:spPr>
+              <a:xfrm>
+                <a:off x="2263333" y="5837551"/>
+                <a:ext cx="1299196" cy="338554"/>
+              </a:xfrm>
+              <a:prstGeom prst="rect">
+                <a:avLst/>
+              </a:prstGeom>
+              <a:solidFill>
+                <a:schemeClr val="bg1"/>
+              </a:solidFill>
+            </p:spPr>
+            <p:txBody>
+              <a:bodyPr wrap="square" rtlCol="0">
+                <a:spAutoFit/>
+              </a:bodyPr>
+              <a:lstStyle/>
+              <a:p>
+                <a:pPr algn="ctr"/>
+                <a:r>
+                  <a:rPr lang="ko-KR" altLang="en-US" sz="1200" dirty="0"/>
+                  <a:t>완료</a:t>
+                </a:r>
+                <a:r>
+                  <a:rPr lang="ko-KR" altLang="en-US" sz="1600" dirty="0"/>
+                  <a:t> </a:t>
+                </a:r>
+              </a:p>
+            </p:txBody>
+          </p:sp>
+          <p:pic>
+            <p:nvPicPr>
+              <p:cNvPr id="3" name="Picture 4" descr="Server PNG Images, Server Icon Free Download - Free ...">
+                <a:extLst>
+                  <a:ext uri="{FF2B5EF4-FFF2-40B4-BE49-F238E27FC236}">
+                    <a16:creationId xmlns:a16="http://schemas.microsoft.com/office/drawing/2014/main" id="{54C477AE-A4C5-0C1A-E24A-30A50C5F146B}"/>
+                  </a:ext>
+                </a:extLst>
+              </p:cNvPr>
+              <p:cNvPicPr>
+                <a:picLocks noChangeAspect="1" noChangeArrowheads="1"/>
+              </p:cNvPicPr>
+              <p:nvPr/>
+            </p:nvPicPr>
+            <p:blipFill>
+              <a:blip r:embed="rId5">
+                <a:extLst>
+                  <a:ext uri="{28A0092B-C50C-407E-A947-70E740481C1C}">
+                    <a14:useLocalDpi xmlns:a14="http://schemas.microsoft.com/office/drawing/2010/main" val="0"/>
+                  </a:ext>
+                </a:extLst>
+              </a:blip>
+              <a:srcRect/>
+              <a:stretch>
+                <a:fillRect/>
+              </a:stretch>
+            </p:blipFill>
+            <p:spPr bwMode="auto">
+              <a:xfrm>
+                <a:off x="9959724" y="530109"/>
+                <a:ext cx="874382" cy="874382"/>
+              </a:xfrm>
+              <a:prstGeom prst="rect">
+                <a:avLst/>
+              </a:prstGeom>
+              <a:noFill/>
+              <a:extLst>
+                <a:ext uri="{909E8E84-426E-40DD-AFC4-6F175D3DCCD1}">
+                  <a14:hiddenFill xmlns:a14="http://schemas.microsoft.com/office/drawing/2010/main">
+                    <a:solidFill>
+                      <a:srgbClr val="FFFFFF"/>
+                    </a:solidFill>
+                  </a14:hiddenFill>
+                </a:ext>
+              </a:extLst>
+            </p:spPr>
+          </p:pic>
+          <p:pic>
+            <p:nvPicPr>
+              <p:cNvPr id="16" name="그래픽 15" descr="모니터 윤곽선">
+                <a:extLst>
+                  <a:ext uri="{FF2B5EF4-FFF2-40B4-BE49-F238E27FC236}">
+                    <a16:creationId xmlns:a16="http://schemas.microsoft.com/office/drawing/2014/main" id="{C9094AC3-89C7-FFF9-FA5C-0BE06615F9C9}"/>
+                  </a:ext>
+                </a:extLst>
+              </p:cNvPr>
+              <p:cNvPicPr>
+                <a:picLocks noChangeAspect="1"/>
+              </p:cNvPicPr>
+              <p:nvPr/>
+            </p:nvPicPr>
+            <p:blipFill>
+              <a:blip r:embed="rId6">
+                <a:extLst>
+                  <a:ext uri="{28A0092B-C50C-407E-A947-70E740481C1C}">
+                    <a14:useLocalDpi xmlns:a14="http://schemas.microsoft.com/office/drawing/2010/main" val="0"/>
+                  </a:ext>
+                  <a:ext uri="{96DAC541-7B7A-43D3-8B79-37D633B846F1}">
+                    <asvg:svgBlip xmlns:asvg="http://schemas.microsoft.com/office/drawing/2016/SVG/main" r:embed="rId7"/>
+                  </a:ext>
+                </a:extLst>
+              </a:blip>
+              <a:stretch>
+                <a:fillRect/>
+              </a:stretch>
+            </p:blipFill>
+            <p:spPr>
+              <a:xfrm>
+                <a:off x="3739283" y="565745"/>
+                <a:ext cx="952226" cy="952226"/>
+              </a:xfrm>
+              <a:prstGeom prst="rect">
+                <a:avLst/>
+              </a:prstGeom>
+            </p:spPr>
+          </p:pic>
+        </p:grpSp>
+        <p:sp>
+          <p:nvSpPr>
+            <p:cNvPr id="9" name="제목 1">
+              <a:extLst>
+                <a:ext uri="{FF2B5EF4-FFF2-40B4-BE49-F238E27FC236}">
+                  <a16:creationId xmlns:a16="http://schemas.microsoft.com/office/drawing/2014/main" id="{9B43DDC8-BF9C-4D68-AFD7-F1771C3A0266}"/>
+                </a:ext>
+              </a:extLst>
+            </p:cNvPr>
+            <p:cNvSpPr txBox="1">
+              <a:spLocks/>
+            </p:cNvSpPr>
+            <p:nvPr/>
+          </p:nvSpPr>
+          <p:spPr>
+            <a:xfrm>
+              <a:off x="414442" y="115145"/>
+              <a:ext cx="5545820" cy="424285"/>
+            </a:xfrm>
+            <a:prstGeom prst="rect">
+              <a:avLst/>
+            </a:prstGeom>
+          </p:spPr>
+          <p:txBody>
+            <a:bodyPr vert="horz" lIns="91440" tIns="45720" rIns="91440" bIns="45720" rtlCol="0" anchor="b">
+              <a:normAutofit/>
+            </a:bodyPr>
+            <a:lstStyle>
+              <a:lvl1pPr algn="ctr" defTabSz="914400" rtl="0" eaLnBrk="1" latinLnBrk="1" hangingPunct="1">
+                <a:lnSpc>
+                  <a:spcPct val="90000"/>
+                </a:lnSpc>
+                <a:spcBef>
+                  <a:spcPct val="0"/>
+                </a:spcBef>
+                <a:buNone/>
+                <a:defRPr sz="6000" kern="1200">
+                  <a:solidFill>
+                    <a:schemeClr val="tx1"/>
+                  </a:solidFill>
+                  <a:latin typeface="+mj-lt"/>
+                  <a:ea typeface="+mj-ea"/>
+                  <a:cs typeface="+mj-cs"/>
+                </a:defRPr>
+              </a:lvl1pPr>
+            </a:lstStyle>
+            <a:p>
+              <a:pPr algn="l"/>
+              <a:r>
+                <a:rPr lang="en-US" altLang="ko-KR" sz="1800" b="1" dirty="0"/>
+                <a:t>OAuth2.0 </a:t>
+              </a:r>
+              <a:r>
+                <a:rPr lang="ko-KR" altLang="en-US" sz="1800" b="1" dirty="0"/>
+                <a:t>권한 부여 승인 코드 방식</a:t>
+              </a:r>
+              <a:endParaRPr lang="ko-KR" altLang="en-US" sz="3200" b="1" dirty="0"/>
+            </a:p>
+          </p:txBody>
+        </p:sp>
+      </p:grpSp>
+    </p:spTree>
+    <p:extLst>
+      <p:ext uri="{BB962C8B-B14F-4D97-AF65-F5344CB8AC3E}">
+        <p14:creationId xmlns:p14="http://schemas.microsoft.com/office/powerpoint/2010/main" val="3540735005"/>
+      </p:ext>
+    </p:extLst>
+  </p:cSld>
+  <p:clrMapOvr>
+    <a:masterClrMapping/>
+  </p:clrMapOvr>
+</p:sld>
+</file>
+
 <file path=ppt/theme/theme1.xml><?xml version="1.0" encoding="utf-8"?>
 <a:theme xmlns:a="http://schemas.openxmlformats.org/drawingml/2006/main" name="Office 테마">
   <a:themeElements>

</xml_diff>